<commit_message>
Updating signing for our projects - TT
</commit_message>
<xml_diff>
--- a/docs/master-slide-ref.pptx
+++ b/docs/master-slide-ref.pptx
@@ -5,8 +5,14 @@
     <p:sldMasterId id="2147483648" r:id="rId1"/>
   </p:sldMasterIdLst>
   <p:notesMasterIdLst>
-    <p:notesMasterId r:id="rId2"/>
+    <p:notesMasterId r:id="rId6"/>
   </p:notesMasterIdLst>
+  <p:sldIdLst>
+    <p:sldId id="256" r:id="rId2"/>
+    <p:sldId id="257" r:id="rId3"/>
+    <p:sldId id="258" r:id="rId4"/>
+    <p:sldId id="259" r:id="rId5"/>
+  </p:sldIdLst>
   <p:sldSz cx="9144000" cy="6858000" type="screen4x3"/>
   <p:notesSz cx="6858000" cy="9144000"/>
   <p:defaultTextStyle>
@@ -307,6 +313,11 @@
       </a:defRPr>
     </a:lvl9pPr>
   </p:defaultTextStyle>
+  <p:extLst>
+    <p:ext uri="{EFAFB233-063F-42B5-8137-9DF3F51BA10A}">
+      <p15:sldGuideLst xmlns:p15="http://schemas.microsoft.com/office/powerpoint/2012/main"/>
+    </p:ext>
+  </p:extLst>
 </p:presentation>
 </file>
 
@@ -28155,6 +28166,1475 @@
     </p:otherStyle>
   </p:txStyles>
 </p:sldMaster>
+</file>
+
+<file path=ppt/slides/slide1.xml><?xml version="1.0" encoding="utf-8"?>
+<p:sld xmlns:a="http://schemas.openxmlformats.org/drawingml/2006/main" xmlns:r="http://schemas.openxmlformats.org/officeDocument/2006/relationships" xmlns:p="http://schemas.openxmlformats.org/presentationml/2006/main">
+  <p:cSld>
+    <p:spTree>
+      <p:nvGrpSpPr>
+        <p:cNvPr id="1" name=""/>
+        <p:cNvGrpSpPr/>
+        <p:nvPr/>
+      </p:nvGrpSpPr>
+      <p:grpSpPr>
+        <a:xfrm>
+          <a:off x="0" y="0"/>
+          <a:ext cx="0" cy="0"/>
+          <a:chOff x="0" y="0"/>
+          <a:chExt cx="0" cy="0"/>
+        </a:xfrm>
+      </p:grpSpPr>
+      <p:sp>
+        <p:nvSpPr>
+          <p:cNvPr id="2" name="Title 1">
+            <a:extLst>
+              <a:ext uri="{FF2B5EF4-FFF2-40B4-BE49-F238E27FC236}">
+                <a16:creationId xmlns:a16="http://schemas.microsoft.com/office/drawing/2014/main" id="{E56C518C-B0FD-0947-A366-D1CB771AF4E0}"/>
+              </a:ext>
+            </a:extLst>
+          </p:cNvPr>
+          <p:cNvSpPr>
+            <a:spLocks noGrp="1"/>
+          </p:cNvSpPr>
+          <p:nvPr>
+            <p:ph type="title"/>
+          </p:nvPr>
+        </p:nvSpPr>
+        <p:spPr/>
+        <p:txBody>
+          <a:bodyPr>
+            <a:normAutofit fontScale="90000"/>
+          </a:bodyPr>
+          <a:lstStyle/>
+          <a:p>
+            <a:r>
+              <a:rPr lang="en-US" dirty="0"/>
+              <a:t>TDD 201: Apple Platforms</a:t>
+            </a:r>
+          </a:p>
+        </p:txBody>
+      </p:sp>
+      <p:sp>
+        <p:nvSpPr>
+          <p:cNvPr id="3" name="Text Placeholder 2">
+            <a:extLst>
+              <a:ext uri="{FF2B5EF4-FFF2-40B4-BE49-F238E27FC236}">
+                <a16:creationId xmlns:a16="http://schemas.microsoft.com/office/drawing/2014/main" id="{4AF25C68-DA52-2A45-9CF7-C40FD762D113}"/>
+              </a:ext>
+            </a:extLst>
+          </p:cNvPr>
+          <p:cNvSpPr>
+            <a:spLocks noGrp="1"/>
+          </p:cNvSpPr>
+          <p:nvPr>
+            <p:ph type="body" sz="quarter" idx="1"/>
+          </p:nvPr>
+        </p:nvSpPr>
+        <p:spPr/>
+        <p:txBody>
+          <a:bodyPr/>
+          <a:lstStyle/>
+          <a:p>
+            <a:r>
+              <a:rPr lang="en-US" dirty="0"/>
+              <a:t>Tyler Thompson: Principal Engineer – Apple Platforms</a:t>
+            </a:r>
+          </a:p>
+        </p:txBody>
+      </p:sp>
+      <p:pic>
+        <p:nvPicPr>
+          <p:cNvPr id="5" name="Picture 4" descr="A person wearing glasses&#10;&#10;Description automatically generated with medium confidence">
+            <a:extLst>
+              <a:ext uri="{FF2B5EF4-FFF2-40B4-BE49-F238E27FC236}">
+                <a16:creationId xmlns:a16="http://schemas.microsoft.com/office/drawing/2014/main" id="{B0DE7441-9686-7541-94F8-12DC8B0FF5C0}"/>
+              </a:ext>
+            </a:extLst>
+          </p:cNvPr>
+          <p:cNvPicPr>
+            <a:picLocks noChangeAspect="1"/>
+          </p:cNvPicPr>
+          <p:nvPr/>
+        </p:nvPicPr>
+        <p:blipFill>
+          <a:blip r:embed="rId2">
+            <a:extLst>
+              <a:ext uri="{28A0092B-C50C-407E-A947-70E740481C1C}">
+                <a14:useLocalDpi xmlns:a14="http://schemas.microsoft.com/office/drawing/2010/main" val="0"/>
+              </a:ext>
+            </a:extLst>
+          </a:blip>
+          <a:stretch>
+            <a:fillRect/>
+          </a:stretch>
+        </p:blipFill>
+        <p:spPr>
+          <a:xfrm>
+            <a:off x="4190452" y="1883979"/>
+            <a:ext cx="784116" cy="784116"/>
+          </a:xfrm>
+          <a:prstGeom prst="rect">
+            <a:avLst/>
+          </a:prstGeom>
+        </p:spPr>
+      </p:pic>
+    </p:spTree>
+    <p:extLst>
+      <p:ext uri="{BB962C8B-B14F-4D97-AF65-F5344CB8AC3E}">
+        <p14:creationId xmlns:p14="http://schemas.microsoft.com/office/powerpoint/2010/main" val="2561041501"/>
+      </p:ext>
+    </p:extLst>
+  </p:cSld>
+  <p:clrMapOvr>
+    <a:masterClrMapping/>
+  </p:clrMapOvr>
+  <p:transition spd="med"/>
+</p:sld>
+</file>
+
+<file path=ppt/slides/slide2.xml><?xml version="1.0" encoding="utf-8"?>
+<p:sld xmlns:a="http://schemas.openxmlformats.org/drawingml/2006/main" xmlns:r="http://schemas.openxmlformats.org/officeDocument/2006/relationships" xmlns:p="http://schemas.openxmlformats.org/presentationml/2006/main">
+  <p:cSld>
+    <p:spTree>
+      <p:nvGrpSpPr>
+        <p:cNvPr id="1" name=""/>
+        <p:cNvGrpSpPr/>
+        <p:nvPr/>
+      </p:nvGrpSpPr>
+      <p:grpSpPr>
+        <a:xfrm>
+          <a:off x="0" y="0"/>
+          <a:ext cx="0" cy="0"/>
+          <a:chOff x="0" y="0"/>
+          <a:chExt cx="0" cy="0"/>
+        </a:xfrm>
+      </p:grpSpPr>
+      <p:sp>
+        <p:nvSpPr>
+          <p:cNvPr id="2" name="Title 1">
+            <a:extLst>
+              <a:ext uri="{FF2B5EF4-FFF2-40B4-BE49-F238E27FC236}">
+                <a16:creationId xmlns:a16="http://schemas.microsoft.com/office/drawing/2014/main" id="{6AC416D0-F62F-A641-9441-F11354F002C1}"/>
+              </a:ext>
+            </a:extLst>
+          </p:cNvPr>
+          <p:cNvSpPr>
+            <a:spLocks noGrp="1"/>
+          </p:cNvSpPr>
+          <p:nvPr>
+            <p:ph type="title"/>
+          </p:nvPr>
+        </p:nvSpPr>
+        <p:spPr/>
+        <p:txBody>
+          <a:bodyPr/>
+          <a:lstStyle/>
+          <a:p>
+            <a:r>
+              <a:rPr lang="en-US" dirty="0"/>
+              <a:t>Who is this course for?</a:t>
+            </a:r>
+          </a:p>
+        </p:txBody>
+      </p:sp>
+      <p:sp>
+        <p:nvSpPr>
+          <p:cNvPr id="3" name="Text Placeholder 2">
+            <a:extLst>
+              <a:ext uri="{FF2B5EF4-FFF2-40B4-BE49-F238E27FC236}">
+                <a16:creationId xmlns:a16="http://schemas.microsoft.com/office/drawing/2014/main" id="{7D10CAAA-CAE2-4740-90CA-E19F2FCE45AC}"/>
+              </a:ext>
+            </a:extLst>
+          </p:cNvPr>
+          <p:cNvSpPr>
+            <a:spLocks noGrp="1"/>
+          </p:cNvSpPr>
+          <p:nvPr>
+            <p:ph type="body" idx="1"/>
+          </p:nvPr>
+        </p:nvSpPr>
+        <p:spPr/>
+        <p:txBody>
+          <a:bodyPr anchor="ctr"/>
+          <a:lstStyle/>
+          <a:p>
+            <a:pPr>
+              <a:lnSpc>
+                <a:spcPct val="200000"/>
+              </a:lnSpc>
+            </a:pPr>
+            <a:r>
+              <a:rPr lang="en-US" dirty="0"/>
+              <a:t>Anybody interested in automated testing for Apple Platforms</a:t>
+            </a:r>
+          </a:p>
+          <a:p>
+            <a:pPr>
+              <a:lnSpc>
+                <a:spcPct val="200000"/>
+              </a:lnSpc>
+            </a:pPr>
+            <a:r>
+              <a:rPr lang="en-US" dirty="0"/>
+              <a:t>People with entry-senior level software engineering experience</a:t>
+            </a:r>
+          </a:p>
+          <a:p>
+            <a:pPr>
+              <a:lnSpc>
+                <a:spcPct val="200000"/>
+              </a:lnSpc>
+            </a:pPr>
+            <a:r>
+              <a:rPr lang="en-US" dirty="0"/>
+              <a:t>New WWTAS employee’s who want to learn some of our preferred testing methods and best practices</a:t>
+            </a:r>
+          </a:p>
+        </p:txBody>
+      </p:sp>
+    </p:spTree>
+    <p:extLst>
+      <p:ext uri="{BB962C8B-B14F-4D97-AF65-F5344CB8AC3E}">
+        <p14:creationId xmlns:p14="http://schemas.microsoft.com/office/powerpoint/2010/main" val="414826498"/>
+      </p:ext>
+    </p:extLst>
+  </p:cSld>
+  <p:clrMapOvr>
+    <a:masterClrMapping/>
+  </p:clrMapOvr>
+  <mc:AlternateContent xmlns:mc="http://schemas.openxmlformats.org/markup-compatibility/2006" xmlns:p159="http://schemas.microsoft.com/office/powerpoint/2015/09/main">
+    <mc:Choice Requires="p159">
+      <p:transition xmlns:p14="http://schemas.microsoft.com/office/powerpoint/2010/main" spd="slow" p14:dur="2000">
+        <p159:morph option="byObject"/>
+      </p:transition>
+    </mc:Choice>
+    <mc:Fallback xmlns="">
+      <p:transition spd="slow">
+        <p:fade/>
+      </p:transition>
+    </mc:Fallback>
+  </mc:AlternateContent>
+  <p:timing>
+    <p:tnLst>
+      <p:par>
+        <p:cTn id="1" dur="indefinite" restart="never" nodeType="tmRoot">
+          <p:childTnLst>
+            <p:seq concurrent="1" nextAc="seek">
+              <p:cTn id="2" dur="indefinite" nodeType="mainSeq">
+                <p:childTnLst>
+                  <p:par>
+                    <p:cTn id="3" fill="hold">
+                      <p:stCondLst>
+                        <p:cond delay="indefinite"/>
+                      </p:stCondLst>
+                      <p:childTnLst>
+                        <p:par>
+                          <p:cTn id="4" fill="hold">
+                            <p:stCondLst>
+                              <p:cond delay="0"/>
+                            </p:stCondLst>
+                            <p:childTnLst>
+                              <p:par>
+                                <p:cTn id="5" presetID="9" presetClass="entr" presetSubtype="0" fill="hold" grpId="0" nodeType="clickEffect">
+                                  <p:stCondLst>
+                                    <p:cond delay="0"/>
+                                  </p:stCondLst>
+                                  <p:childTnLst>
+                                    <p:set>
+                                      <p:cBhvr>
+                                        <p:cTn id="6" dur="1" fill="hold">
+                                          <p:stCondLst>
+                                            <p:cond delay="0"/>
+                                          </p:stCondLst>
+                                        </p:cTn>
+                                        <p:tgtEl>
+                                          <p:spTgt spid="3">
+                                            <p:txEl>
+                                              <p:pRg st="0" end="0"/>
+                                            </p:txEl>
+                                          </p:spTgt>
+                                        </p:tgtEl>
+                                        <p:attrNameLst>
+                                          <p:attrName>style.visibility</p:attrName>
+                                        </p:attrNameLst>
+                                      </p:cBhvr>
+                                      <p:to>
+                                        <p:strVal val="visible"/>
+                                      </p:to>
+                                    </p:set>
+                                    <p:animEffect transition="in" filter="dissolve">
+                                      <p:cBhvr>
+                                        <p:cTn id="7" dur="500"/>
+                                        <p:tgtEl>
+                                          <p:spTgt spid="3">
+                                            <p:txEl>
+                                              <p:pRg st="0" end="0"/>
+                                            </p:txEl>
+                                          </p:spTgt>
+                                        </p:tgtEl>
+                                      </p:cBhvr>
+                                    </p:animEffect>
+                                  </p:childTnLst>
+                                </p:cTn>
+                              </p:par>
+                            </p:childTnLst>
+                          </p:cTn>
+                        </p:par>
+                      </p:childTnLst>
+                    </p:cTn>
+                  </p:par>
+                  <p:par>
+                    <p:cTn id="8" fill="hold">
+                      <p:stCondLst>
+                        <p:cond delay="indefinite"/>
+                      </p:stCondLst>
+                      <p:childTnLst>
+                        <p:par>
+                          <p:cTn id="9" fill="hold">
+                            <p:stCondLst>
+                              <p:cond delay="0"/>
+                            </p:stCondLst>
+                            <p:childTnLst>
+                              <p:par>
+                                <p:cTn id="10" presetID="9" presetClass="entr" presetSubtype="0" fill="hold" grpId="0" nodeType="clickEffect">
+                                  <p:stCondLst>
+                                    <p:cond delay="0"/>
+                                  </p:stCondLst>
+                                  <p:childTnLst>
+                                    <p:set>
+                                      <p:cBhvr>
+                                        <p:cTn id="11" dur="1" fill="hold">
+                                          <p:stCondLst>
+                                            <p:cond delay="0"/>
+                                          </p:stCondLst>
+                                        </p:cTn>
+                                        <p:tgtEl>
+                                          <p:spTgt spid="3">
+                                            <p:txEl>
+                                              <p:pRg st="1" end="1"/>
+                                            </p:txEl>
+                                          </p:spTgt>
+                                        </p:tgtEl>
+                                        <p:attrNameLst>
+                                          <p:attrName>style.visibility</p:attrName>
+                                        </p:attrNameLst>
+                                      </p:cBhvr>
+                                      <p:to>
+                                        <p:strVal val="visible"/>
+                                      </p:to>
+                                    </p:set>
+                                    <p:animEffect transition="in" filter="dissolve">
+                                      <p:cBhvr>
+                                        <p:cTn id="12" dur="500"/>
+                                        <p:tgtEl>
+                                          <p:spTgt spid="3">
+                                            <p:txEl>
+                                              <p:pRg st="1" end="1"/>
+                                            </p:txEl>
+                                          </p:spTgt>
+                                        </p:tgtEl>
+                                      </p:cBhvr>
+                                    </p:animEffect>
+                                  </p:childTnLst>
+                                </p:cTn>
+                              </p:par>
+                            </p:childTnLst>
+                          </p:cTn>
+                        </p:par>
+                      </p:childTnLst>
+                    </p:cTn>
+                  </p:par>
+                  <p:par>
+                    <p:cTn id="13" fill="hold">
+                      <p:stCondLst>
+                        <p:cond delay="indefinite"/>
+                      </p:stCondLst>
+                      <p:childTnLst>
+                        <p:par>
+                          <p:cTn id="14" fill="hold">
+                            <p:stCondLst>
+                              <p:cond delay="0"/>
+                            </p:stCondLst>
+                            <p:childTnLst>
+                              <p:par>
+                                <p:cTn id="15" presetID="9" presetClass="entr" presetSubtype="0" fill="hold" grpId="0" nodeType="clickEffect">
+                                  <p:stCondLst>
+                                    <p:cond delay="0"/>
+                                  </p:stCondLst>
+                                  <p:childTnLst>
+                                    <p:set>
+                                      <p:cBhvr>
+                                        <p:cTn id="16" dur="1" fill="hold">
+                                          <p:stCondLst>
+                                            <p:cond delay="0"/>
+                                          </p:stCondLst>
+                                        </p:cTn>
+                                        <p:tgtEl>
+                                          <p:spTgt spid="3">
+                                            <p:txEl>
+                                              <p:pRg st="2" end="2"/>
+                                            </p:txEl>
+                                          </p:spTgt>
+                                        </p:tgtEl>
+                                        <p:attrNameLst>
+                                          <p:attrName>style.visibility</p:attrName>
+                                        </p:attrNameLst>
+                                      </p:cBhvr>
+                                      <p:to>
+                                        <p:strVal val="visible"/>
+                                      </p:to>
+                                    </p:set>
+                                    <p:animEffect transition="in" filter="dissolve">
+                                      <p:cBhvr>
+                                        <p:cTn id="17" dur="500"/>
+                                        <p:tgtEl>
+                                          <p:spTgt spid="3">
+                                            <p:txEl>
+                                              <p:pRg st="2" end="2"/>
+                                            </p:txEl>
+                                          </p:spTgt>
+                                        </p:tgtEl>
+                                      </p:cBhvr>
+                                    </p:animEffect>
+                                  </p:childTnLst>
+                                </p:cTn>
+                              </p:par>
+                            </p:childTnLst>
+                          </p:cTn>
+                        </p:par>
+                      </p:childTnLst>
+                    </p:cTn>
+                  </p:par>
+                </p:childTnLst>
+              </p:cTn>
+              <p:prevCondLst>
+                <p:cond evt="onPrev" delay="0">
+                  <p:tgtEl>
+                    <p:sldTgt/>
+                  </p:tgtEl>
+                </p:cond>
+              </p:prevCondLst>
+              <p:nextCondLst>
+                <p:cond evt="onNext" delay="0">
+                  <p:tgtEl>
+                    <p:sldTgt/>
+                  </p:tgtEl>
+                </p:cond>
+              </p:nextCondLst>
+            </p:seq>
+          </p:childTnLst>
+        </p:cTn>
+      </p:par>
+    </p:tnLst>
+    <p:bldLst>
+      <p:bldP spid="3" grpId="0" uiExpand="1" build="p"/>
+    </p:bldLst>
+  </p:timing>
+</p:sld>
+</file>
+
+<file path=ppt/slides/slide3.xml><?xml version="1.0" encoding="utf-8"?>
+<p:sld xmlns:a="http://schemas.openxmlformats.org/drawingml/2006/main" xmlns:r="http://schemas.openxmlformats.org/officeDocument/2006/relationships" xmlns:p="http://schemas.openxmlformats.org/presentationml/2006/main">
+  <p:cSld>
+    <p:spTree>
+      <p:nvGrpSpPr>
+        <p:cNvPr id="1" name=""/>
+        <p:cNvGrpSpPr/>
+        <p:nvPr/>
+      </p:nvGrpSpPr>
+      <p:grpSpPr>
+        <a:xfrm>
+          <a:off x="0" y="0"/>
+          <a:ext cx="0" cy="0"/>
+          <a:chOff x="0" y="0"/>
+          <a:chExt cx="0" cy="0"/>
+        </a:xfrm>
+      </p:grpSpPr>
+      <p:sp>
+        <p:nvSpPr>
+          <p:cNvPr id="2" name="Title 1">
+            <a:extLst>
+              <a:ext uri="{FF2B5EF4-FFF2-40B4-BE49-F238E27FC236}">
+                <a16:creationId xmlns:a16="http://schemas.microsoft.com/office/drawing/2014/main" id="{D138EF7A-F64C-284D-822E-84CD47F13C71}"/>
+              </a:ext>
+            </a:extLst>
+          </p:cNvPr>
+          <p:cNvSpPr>
+            <a:spLocks noGrp="1"/>
+          </p:cNvSpPr>
+          <p:nvPr>
+            <p:ph type="title"/>
+          </p:nvPr>
+        </p:nvSpPr>
+        <p:spPr/>
+        <p:txBody>
+          <a:bodyPr/>
+          <a:lstStyle/>
+          <a:p>
+            <a:r>
+              <a:rPr lang="en-US" dirty="0"/>
+              <a:t>What will be covered?</a:t>
+            </a:r>
+          </a:p>
+        </p:txBody>
+      </p:sp>
+      <p:sp>
+        <p:nvSpPr>
+          <p:cNvPr id="3" name="Text Placeholder 2">
+            <a:extLst>
+              <a:ext uri="{FF2B5EF4-FFF2-40B4-BE49-F238E27FC236}">
+                <a16:creationId xmlns:a16="http://schemas.microsoft.com/office/drawing/2014/main" id="{78BD4DAA-67AB-A744-9C0D-2B7095B9FAC8}"/>
+              </a:ext>
+            </a:extLst>
+          </p:cNvPr>
+          <p:cNvSpPr>
+            <a:spLocks noGrp="1"/>
+          </p:cNvSpPr>
+          <p:nvPr>
+            <p:ph type="body" idx="1"/>
+          </p:nvPr>
+        </p:nvSpPr>
+        <p:spPr/>
+        <p:txBody>
+          <a:bodyPr>
+            <a:normAutofit lnSpcReduction="10000"/>
+          </a:bodyPr>
+          <a:lstStyle/>
+          <a:p>
+            <a:pPr>
+              <a:lnSpc>
+                <a:spcPct val="150000"/>
+              </a:lnSpc>
+            </a:pPr>
+            <a:r>
+              <a:rPr lang="en-US" dirty="0"/>
+              <a:t>TDD concepts</a:t>
+            </a:r>
+          </a:p>
+          <a:p>
+            <a:pPr>
+              <a:lnSpc>
+                <a:spcPct val="150000"/>
+              </a:lnSpc>
+            </a:pPr>
+            <a:r>
+              <a:rPr lang="en-US" dirty="0"/>
+              <a:t>Unit, Integration, Contract, Behavior, and UI Testing</a:t>
+            </a:r>
+          </a:p>
+          <a:p>
+            <a:pPr>
+              <a:lnSpc>
+                <a:spcPct val="150000"/>
+              </a:lnSpc>
+            </a:pPr>
+            <a:r>
+              <a:rPr lang="en-US" dirty="0"/>
+              <a:t>A variety of common things you’ll want to test while writing for iOS, macOS, </a:t>
+            </a:r>
+            <a:r>
+              <a:rPr lang="en-US" dirty="0" err="1"/>
+              <a:t>tvOS</a:t>
+            </a:r>
+            <a:r>
+              <a:rPr lang="en-US" dirty="0"/>
+              <a:t>, </a:t>
+            </a:r>
+            <a:r>
+              <a:rPr lang="en-US" dirty="0" err="1"/>
+              <a:t>watchOS</a:t>
+            </a:r>
+            <a:r>
+              <a:rPr lang="en-US" dirty="0"/>
+              <a:t>, and </a:t>
+            </a:r>
+            <a:r>
+              <a:rPr lang="en-US" dirty="0" err="1"/>
+              <a:t>iPadOS</a:t>
+            </a:r>
+            <a:endParaRPr lang="en-US" dirty="0"/>
+          </a:p>
+          <a:p>
+            <a:pPr>
+              <a:lnSpc>
+                <a:spcPct val="150000"/>
+              </a:lnSpc>
+            </a:pPr>
+            <a:r>
+              <a:rPr lang="en-US" dirty="0"/>
+              <a:t>Ways of testing without having to change your production code</a:t>
+            </a:r>
+          </a:p>
+          <a:p>
+            <a:pPr>
+              <a:lnSpc>
+                <a:spcPct val="150000"/>
+              </a:lnSpc>
+            </a:pPr>
+            <a:r>
+              <a:rPr lang="en-US" dirty="0"/>
+              <a:t>Tooling that exists for Apple Development testing, where it’s useful, and where it falls short</a:t>
+            </a:r>
+          </a:p>
+          <a:p>
+            <a:pPr>
+              <a:lnSpc>
+                <a:spcPct val="150000"/>
+              </a:lnSpc>
+            </a:pPr>
+            <a:r>
+              <a:rPr lang="en-US" dirty="0"/>
+              <a:t>Some of our preferred practices for writing Swift, for readability and testability</a:t>
+            </a:r>
+          </a:p>
+        </p:txBody>
+      </p:sp>
+    </p:spTree>
+    <p:extLst>
+      <p:ext uri="{BB962C8B-B14F-4D97-AF65-F5344CB8AC3E}">
+        <p14:creationId xmlns:p14="http://schemas.microsoft.com/office/powerpoint/2010/main" val="1174205606"/>
+      </p:ext>
+    </p:extLst>
+  </p:cSld>
+  <p:clrMapOvr>
+    <a:masterClrMapping/>
+  </p:clrMapOvr>
+  <mc:AlternateContent xmlns:mc="http://schemas.openxmlformats.org/markup-compatibility/2006" xmlns:p159="http://schemas.microsoft.com/office/powerpoint/2015/09/main">
+    <mc:Choice Requires="p159">
+      <p:transition xmlns:p14="http://schemas.microsoft.com/office/powerpoint/2010/main" spd="slow" p14:dur="2000">
+        <p159:morph option="byObject"/>
+      </p:transition>
+    </mc:Choice>
+    <mc:Fallback xmlns="">
+      <p:transition spd="slow">
+        <p:fade/>
+      </p:transition>
+    </mc:Fallback>
+  </mc:AlternateContent>
+  <p:timing>
+    <p:tnLst>
+      <p:par>
+        <p:cTn id="1" dur="indefinite" restart="never" nodeType="tmRoot">
+          <p:childTnLst>
+            <p:seq concurrent="1" nextAc="seek">
+              <p:cTn id="2" dur="indefinite" nodeType="mainSeq">
+                <p:childTnLst>
+                  <p:par>
+                    <p:cTn id="3" fill="hold">
+                      <p:stCondLst>
+                        <p:cond delay="indefinite"/>
+                      </p:stCondLst>
+                      <p:childTnLst>
+                        <p:par>
+                          <p:cTn id="4" fill="hold">
+                            <p:stCondLst>
+                              <p:cond delay="0"/>
+                            </p:stCondLst>
+                            <p:childTnLst>
+                              <p:par>
+                                <p:cTn id="5" presetID="9" presetClass="entr" presetSubtype="0" fill="hold" grpId="0" nodeType="clickEffect">
+                                  <p:stCondLst>
+                                    <p:cond delay="0"/>
+                                  </p:stCondLst>
+                                  <p:childTnLst>
+                                    <p:set>
+                                      <p:cBhvr>
+                                        <p:cTn id="6" dur="1" fill="hold">
+                                          <p:stCondLst>
+                                            <p:cond delay="0"/>
+                                          </p:stCondLst>
+                                        </p:cTn>
+                                        <p:tgtEl>
+                                          <p:spTgt spid="3">
+                                            <p:txEl>
+                                              <p:pRg st="0" end="0"/>
+                                            </p:txEl>
+                                          </p:spTgt>
+                                        </p:tgtEl>
+                                        <p:attrNameLst>
+                                          <p:attrName>style.visibility</p:attrName>
+                                        </p:attrNameLst>
+                                      </p:cBhvr>
+                                      <p:to>
+                                        <p:strVal val="visible"/>
+                                      </p:to>
+                                    </p:set>
+                                    <p:animEffect transition="in" filter="dissolve">
+                                      <p:cBhvr>
+                                        <p:cTn id="7" dur="500"/>
+                                        <p:tgtEl>
+                                          <p:spTgt spid="3">
+                                            <p:txEl>
+                                              <p:pRg st="0" end="0"/>
+                                            </p:txEl>
+                                          </p:spTgt>
+                                        </p:tgtEl>
+                                      </p:cBhvr>
+                                    </p:animEffect>
+                                  </p:childTnLst>
+                                </p:cTn>
+                              </p:par>
+                            </p:childTnLst>
+                          </p:cTn>
+                        </p:par>
+                      </p:childTnLst>
+                    </p:cTn>
+                  </p:par>
+                  <p:par>
+                    <p:cTn id="8" fill="hold">
+                      <p:stCondLst>
+                        <p:cond delay="indefinite"/>
+                      </p:stCondLst>
+                      <p:childTnLst>
+                        <p:par>
+                          <p:cTn id="9" fill="hold">
+                            <p:stCondLst>
+                              <p:cond delay="0"/>
+                            </p:stCondLst>
+                            <p:childTnLst>
+                              <p:par>
+                                <p:cTn id="10" presetID="9" presetClass="entr" presetSubtype="0" fill="hold" grpId="0" nodeType="clickEffect">
+                                  <p:stCondLst>
+                                    <p:cond delay="0"/>
+                                  </p:stCondLst>
+                                  <p:childTnLst>
+                                    <p:set>
+                                      <p:cBhvr>
+                                        <p:cTn id="11" dur="1" fill="hold">
+                                          <p:stCondLst>
+                                            <p:cond delay="0"/>
+                                          </p:stCondLst>
+                                        </p:cTn>
+                                        <p:tgtEl>
+                                          <p:spTgt spid="3">
+                                            <p:txEl>
+                                              <p:pRg st="1" end="1"/>
+                                            </p:txEl>
+                                          </p:spTgt>
+                                        </p:tgtEl>
+                                        <p:attrNameLst>
+                                          <p:attrName>style.visibility</p:attrName>
+                                        </p:attrNameLst>
+                                      </p:cBhvr>
+                                      <p:to>
+                                        <p:strVal val="visible"/>
+                                      </p:to>
+                                    </p:set>
+                                    <p:animEffect transition="in" filter="dissolve">
+                                      <p:cBhvr>
+                                        <p:cTn id="12" dur="500"/>
+                                        <p:tgtEl>
+                                          <p:spTgt spid="3">
+                                            <p:txEl>
+                                              <p:pRg st="1" end="1"/>
+                                            </p:txEl>
+                                          </p:spTgt>
+                                        </p:tgtEl>
+                                      </p:cBhvr>
+                                    </p:animEffect>
+                                  </p:childTnLst>
+                                </p:cTn>
+                              </p:par>
+                            </p:childTnLst>
+                          </p:cTn>
+                        </p:par>
+                      </p:childTnLst>
+                    </p:cTn>
+                  </p:par>
+                  <p:par>
+                    <p:cTn id="13" fill="hold">
+                      <p:stCondLst>
+                        <p:cond delay="indefinite"/>
+                      </p:stCondLst>
+                      <p:childTnLst>
+                        <p:par>
+                          <p:cTn id="14" fill="hold">
+                            <p:stCondLst>
+                              <p:cond delay="0"/>
+                            </p:stCondLst>
+                            <p:childTnLst>
+                              <p:par>
+                                <p:cTn id="15" presetID="9" presetClass="entr" presetSubtype="0" fill="hold" grpId="0" nodeType="clickEffect">
+                                  <p:stCondLst>
+                                    <p:cond delay="0"/>
+                                  </p:stCondLst>
+                                  <p:childTnLst>
+                                    <p:set>
+                                      <p:cBhvr>
+                                        <p:cTn id="16" dur="1" fill="hold">
+                                          <p:stCondLst>
+                                            <p:cond delay="0"/>
+                                          </p:stCondLst>
+                                        </p:cTn>
+                                        <p:tgtEl>
+                                          <p:spTgt spid="3">
+                                            <p:txEl>
+                                              <p:pRg st="2" end="2"/>
+                                            </p:txEl>
+                                          </p:spTgt>
+                                        </p:tgtEl>
+                                        <p:attrNameLst>
+                                          <p:attrName>style.visibility</p:attrName>
+                                        </p:attrNameLst>
+                                      </p:cBhvr>
+                                      <p:to>
+                                        <p:strVal val="visible"/>
+                                      </p:to>
+                                    </p:set>
+                                    <p:animEffect transition="in" filter="dissolve">
+                                      <p:cBhvr>
+                                        <p:cTn id="17" dur="500"/>
+                                        <p:tgtEl>
+                                          <p:spTgt spid="3">
+                                            <p:txEl>
+                                              <p:pRg st="2" end="2"/>
+                                            </p:txEl>
+                                          </p:spTgt>
+                                        </p:tgtEl>
+                                      </p:cBhvr>
+                                    </p:animEffect>
+                                  </p:childTnLst>
+                                </p:cTn>
+                              </p:par>
+                            </p:childTnLst>
+                          </p:cTn>
+                        </p:par>
+                      </p:childTnLst>
+                    </p:cTn>
+                  </p:par>
+                  <p:par>
+                    <p:cTn id="18" fill="hold">
+                      <p:stCondLst>
+                        <p:cond delay="indefinite"/>
+                      </p:stCondLst>
+                      <p:childTnLst>
+                        <p:par>
+                          <p:cTn id="19" fill="hold">
+                            <p:stCondLst>
+                              <p:cond delay="0"/>
+                            </p:stCondLst>
+                            <p:childTnLst>
+                              <p:par>
+                                <p:cTn id="20" presetID="9" presetClass="entr" presetSubtype="0" fill="hold" grpId="0" nodeType="clickEffect">
+                                  <p:stCondLst>
+                                    <p:cond delay="0"/>
+                                  </p:stCondLst>
+                                  <p:childTnLst>
+                                    <p:set>
+                                      <p:cBhvr>
+                                        <p:cTn id="21" dur="1" fill="hold">
+                                          <p:stCondLst>
+                                            <p:cond delay="0"/>
+                                          </p:stCondLst>
+                                        </p:cTn>
+                                        <p:tgtEl>
+                                          <p:spTgt spid="3">
+                                            <p:txEl>
+                                              <p:pRg st="3" end="3"/>
+                                            </p:txEl>
+                                          </p:spTgt>
+                                        </p:tgtEl>
+                                        <p:attrNameLst>
+                                          <p:attrName>style.visibility</p:attrName>
+                                        </p:attrNameLst>
+                                      </p:cBhvr>
+                                      <p:to>
+                                        <p:strVal val="visible"/>
+                                      </p:to>
+                                    </p:set>
+                                    <p:animEffect transition="in" filter="dissolve">
+                                      <p:cBhvr>
+                                        <p:cTn id="22" dur="500"/>
+                                        <p:tgtEl>
+                                          <p:spTgt spid="3">
+                                            <p:txEl>
+                                              <p:pRg st="3" end="3"/>
+                                            </p:txEl>
+                                          </p:spTgt>
+                                        </p:tgtEl>
+                                      </p:cBhvr>
+                                    </p:animEffect>
+                                  </p:childTnLst>
+                                </p:cTn>
+                              </p:par>
+                            </p:childTnLst>
+                          </p:cTn>
+                        </p:par>
+                      </p:childTnLst>
+                    </p:cTn>
+                  </p:par>
+                  <p:par>
+                    <p:cTn id="23" fill="hold">
+                      <p:stCondLst>
+                        <p:cond delay="indefinite"/>
+                      </p:stCondLst>
+                      <p:childTnLst>
+                        <p:par>
+                          <p:cTn id="24" fill="hold">
+                            <p:stCondLst>
+                              <p:cond delay="0"/>
+                            </p:stCondLst>
+                            <p:childTnLst>
+                              <p:par>
+                                <p:cTn id="25" presetID="9" presetClass="entr" presetSubtype="0" fill="hold" grpId="0" nodeType="clickEffect">
+                                  <p:stCondLst>
+                                    <p:cond delay="0"/>
+                                  </p:stCondLst>
+                                  <p:childTnLst>
+                                    <p:set>
+                                      <p:cBhvr>
+                                        <p:cTn id="26" dur="1" fill="hold">
+                                          <p:stCondLst>
+                                            <p:cond delay="0"/>
+                                          </p:stCondLst>
+                                        </p:cTn>
+                                        <p:tgtEl>
+                                          <p:spTgt spid="3">
+                                            <p:txEl>
+                                              <p:pRg st="4" end="4"/>
+                                            </p:txEl>
+                                          </p:spTgt>
+                                        </p:tgtEl>
+                                        <p:attrNameLst>
+                                          <p:attrName>style.visibility</p:attrName>
+                                        </p:attrNameLst>
+                                      </p:cBhvr>
+                                      <p:to>
+                                        <p:strVal val="visible"/>
+                                      </p:to>
+                                    </p:set>
+                                    <p:animEffect transition="in" filter="dissolve">
+                                      <p:cBhvr>
+                                        <p:cTn id="27" dur="500"/>
+                                        <p:tgtEl>
+                                          <p:spTgt spid="3">
+                                            <p:txEl>
+                                              <p:pRg st="4" end="4"/>
+                                            </p:txEl>
+                                          </p:spTgt>
+                                        </p:tgtEl>
+                                      </p:cBhvr>
+                                    </p:animEffect>
+                                  </p:childTnLst>
+                                </p:cTn>
+                              </p:par>
+                            </p:childTnLst>
+                          </p:cTn>
+                        </p:par>
+                      </p:childTnLst>
+                    </p:cTn>
+                  </p:par>
+                  <p:par>
+                    <p:cTn id="28" fill="hold">
+                      <p:stCondLst>
+                        <p:cond delay="indefinite"/>
+                      </p:stCondLst>
+                      <p:childTnLst>
+                        <p:par>
+                          <p:cTn id="29" fill="hold">
+                            <p:stCondLst>
+                              <p:cond delay="0"/>
+                            </p:stCondLst>
+                            <p:childTnLst>
+                              <p:par>
+                                <p:cTn id="30" presetID="9" presetClass="entr" presetSubtype="0" fill="hold" grpId="0" nodeType="clickEffect">
+                                  <p:stCondLst>
+                                    <p:cond delay="0"/>
+                                  </p:stCondLst>
+                                  <p:childTnLst>
+                                    <p:set>
+                                      <p:cBhvr>
+                                        <p:cTn id="31" dur="1" fill="hold">
+                                          <p:stCondLst>
+                                            <p:cond delay="0"/>
+                                          </p:stCondLst>
+                                        </p:cTn>
+                                        <p:tgtEl>
+                                          <p:spTgt spid="3">
+                                            <p:txEl>
+                                              <p:pRg st="5" end="5"/>
+                                            </p:txEl>
+                                          </p:spTgt>
+                                        </p:tgtEl>
+                                        <p:attrNameLst>
+                                          <p:attrName>style.visibility</p:attrName>
+                                        </p:attrNameLst>
+                                      </p:cBhvr>
+                                      <p:to>
+                                        <p:strVal val="visible"/>
+                                      </p:to>
+                                    </p:set>
+                                    <p:animEffect transition="in" filter="dissolve">
+                                      <p:cBhvr>
+                                        <p:cTn id="32" dur="500"/>
+                                        <p:tgtEl>
+                                          <p:spTgt spid="3">
+                                            <p:txEl>
+                                              <p:pRg st="5" end="5"/>
+                                            </p:txEl>
+                                          </p:spTgt>
+                                        </p:tgtEl>
+                                      </p:cBhvr>
+                                    </p:animEffect>
+                                  </p:childTnLst>
+                                </p:cTn>
+                              </p:par>
+                            </p:childTnLst>
+                          </p:cTn>
+                        </p:par>
+                      </p:childTnLst>
+                    </p:cTn>
+                  </p:par>
+                </p:childTnLst>
+              </p:cTn>
+              <p:prevCondLst>
+                <p:cond evt="onPrev" delay="0">
+                  <p:tgtEl>
+                    <p:sldTgt/>
+                  </p:tgtEl>
+                </p:cond>
+              </p:prevCondLst>
+              <p:nextCondLst>
+                <p:cond evt="onNext" delay="0">
+                  <p:tgtEl>
+                    <p:sldTgt/>
+                  </p:tgtEl>
+                </p:cond>
+              </p:nextCondLst>
+            </p:seq>
+          </p:childTnLst>
+        </p:cTn>
+      </p:par>
+    </p:tnLst>
+    <p:bldLst>
+      <p:bldP spid="3" grpId="0" uiExpand="1" build="p"/>
+    </p:bldLst>
+  </p:timing>
+</p:sld>
+</file>
+
+<file path=ppt/slides/slide4.xml><?xml version="1.0" encoding="utf-8"?>
+<p:sld xmlns:a="http://schemas.openxmlformats.org/drawingml/2006/main" xmlns:r="http://schemas.openxmlformats.org/officeDocument/2006/relationships" xmlns:p="http://schemas.openxmlformats.org/presentationml/2006/main">
+  <p:cSld>
+    <p:spTree>
+      <p:nvGrpSpPr>
+        <p:cNvPr id="1" name=""/>
+        <p:cNvGrpSpPr/>
+        <p:nvPr/>
+      </p:nvGrpSpPr>
+      <p:grpSpPr>
+        <a:xfrm>
+          <a:off x="0" y="0"/>
+          <a:ext cx="0" cy="0"/>
+          <a:chOff x="0" y="0"/>
+          <a:chExt cx="0" cy="0"/>
+        </a:xfrm>
+      </p:grpSpPr>
+      <p:sp>
+        <p:nvSpPr>
+          <p:cNvPr id="2" name="Title 1">
+            <a:extLst>
+              <a:ext uri="{FF2B5EF4-FFF2-40B4-BE49-F238E27FC236}">
+                <a16:creationId xmlns:a16="http://schemas.microsoft.com/office/drawing/2014/main" id="{D138EF7A-F64C-284D-822E-84CD47F13C71}"/>
+              </a:ext>
+            </a:extLst>
+          </p:cNvPr>
+          <p:cNvSpPr>
+            <a:spLocks noGrp="1"/>
+          </p:cNvSpPr>
+          <p:nvPr>
+            <p:ph type="title"/>
+          </p:nvPr>
+        </p:nvSpPr>
+        <p:spPr/>
+        <p:txBody>
+          <a:bodyPr/>
+          <a:lstStyle/>
+          <a:p>
+            <a:r>
+              <a:rPr lang="en-US" dirty="0"/>
+              <a:t>Getting Started</a:t>
+            </a:r>
+          </a:p>
+        </p:txBody>
+      </p:sp>
+      <p:sp>
+        <p:nvSpPr>
+          <p:cNvPr id="3" name="Text Placeholder 2">
+            <a:extLst>
+              <a:ext uri="{FF2B5EF4-FFF2-40B4-BE49-F238E27FC236}">
+                <a16:creationId xmlns:a16="http://schemas.microsoft.com/office/drawing/2014/main" id="{78BD4DAA-67AB-A744-9C0D-2B7095B9FAC8}"/>
+              </a:ext>
+            </a:extLst>
+          </p:cNvPr>
+          <p:cNvSpPr>
+            <a:spLocks noGrp="1"/>
+          </p:cNvSpPr>
+          <p:nvPr>
+            <p:ph type="body" idx="1"/>
+          </p:nvPr>
+        </p:nvSpPr>
+        <p:spPr/>
+        <p:txBody>
+          <a:bodyPr>
+            <a:normAutofit/>
+          </a:bodyPr>
+          <a:lstStyle/>
+          <a:p>
+            <a:pPr>
+              <a:lnSpc>
+                <a:spcPct val="160000"/>
+              </a:lnSpc>
+            </a:pPr>
+            <a:r>
+              <a:rPr lang="en-US" dirty="0"/>
+              <a:t>Make sure you've got the repo cloned</a:t>
+            </a:r>
+          </a:p>
+          <a:p>
+            <a:pPr>
+              <a:lnSpc>
+                <a:spcPct val="160000"/>
+              </a:lnSpc>
+            </a:pPr>
+            <a:r>
+              <a:rPr lang="en-US" dirty="0"/>
+              <a:t>The repo has one branch named “Completed” with all the code finished, it also has a branch per lesson. For example the one for dependency injection is named dependency-injection. Checkout the branch for the lesson you're taking before you start it.</a:t>
+            </a:r>
+          </a:p>
+          <a:p>
+            <a:pPr>
+              <a:lnSpc>
+                <a:spcPct val="160000"/>
+              </a:lnSpc>
+            </a:pPr>
+            <a:r>
+              <a:rPr lang="en-US" dirty="0"/>
+              <a:t>Make sure you've got CocoaPods installed</a:t>
+            </a:r>
+          </a:p>
+          <a:p>
+            <a:pPr>
+              <a:lnSpc>
+                <a:spcPct val="160000"/>
+              </a:lnSpc>
+            </a:pPr>
+            <a:r>
+              <a:rPr lang="en-US" dirty="0"/>
+              <a:t>Get the latest version of </a:t>
+            </a:r>
+            <a:r>
+              <a:rPr lang="en-US" dirty="0" err="1"/>
+              <a:t>Xcode</a:t>
+            </a:r>
+            <a:r>
+              <a:rPr lang="en-US" dirty="0"/>
+              <a:t>, some lessons are written with Swift 5, so you'll need at least that</a:t>
+            </a:r>
+          </a:p>
+        </p:txBody>
+      </p:sp>
+    </p:spTree>
+    <p:extLst>
+      <p:ext uri="{BB962C8B-B14F-4D97-AF65-F5344CB8AC3E}">
+        <p14:creationId xmlns:p14="http://schemas.microsoft.com/office/powerpoint/2010/main" val="4032466169"/>
+      </p:ext>
+    </p:extLst>
+  </p:cSld>
+  <p:clrMapOvr>
+    <a:masterClrMapping/>
+  </p:clrMapOvr>
+  <mc:AlternateContent xmlns:mc="http://schemas.openxmlformats.org/markup-compatibility/2006">
+    <mc:Choice xmlns:p159="http://schemas.microsoft.com/office/powerpoint/2015/09/main" Requires="p159">
+      <p:transition xmlns:p14="http://schemas.microsoft.com/office/powerpoint/2010/main" spd="slow" p14:dur="2000">
+        <p159:morph option="byObject"/>
+      </p:transition>
+    </mc:Choice>
+    <mc:Fallback>
+      <p:transition spd="slow">
+        <p:fade/>
+      </p:transition>
+    </mc:Fallback>
+  </mc:AlternateContent>
+  <p:timing>
+    <p:tnLst>
+      <p:par>
+        <p:cTn id="1" dur="indefinite" restart="never" nodeType="tmRoot">
+          <p:childTnLst>
+            <p:seq concurrent="1" nextAc="seek">
+              <p:cTn id="2" dur="indefinite" nodeType="mainSeq">
+                <p:childTnLst>
+                  <p:par>
+                    <p:cTn id="3" fill="hold">
+                      <p:stCondLst>
+                        <p:cond delay="indefinite"/>
+                      </p:stCondLst>
+                      <p:childTnLst>
+                        <p:par>
+                          <p:cTn id="4" fill="hold">
+                            <p:stCondLst>
+                              <p:cond delay="0"/>
+                            </p:stCondLst>
+                            <p:childTnLst>
+                              <p:par>
+                                <p:cTn id="5" presetID="9" presetClass="entr" presetSubtype="0" fill="hold" grpId="0" nodeType="clickEffect">
+                                  <p:stCondLst>
+                                    <p:cond delay="0"/>
+                                  </p:stCondLst>
+                                  <p:childTnLst>
+                                    <p:set>
+                                      <p:cBhvr>
+                                        <p:cTn id="6" dur="1" fill="hold">
+                                          <p:stCondLst>
+                                            <p:cond delay="0"/>
+                                          </p:stCondLst>
+                                        </p:cTn>
+                                        <p:tgtEl>
+                                          <p:spTgt spid="3">
+                                            <p:txEl>
+                                              <p:pRg st="0" end="0"/>
+                                            </p:txEl>
+                                          </p:spTgt>
+                                        </p:tgtEl>
+                                        <p:attrNameLst>
+                                          <p:attrName>style.visibility</p:attrName>
+                                        </p:attrNameLst>
+                                      </p:cBhvr>
+                                      <p:to>
+                                        <p:strVal val="visible"/>
+                                      </p:to>
+                                    </p:set>
+                                    <p:animEffect transition="in" filter="dissolve">
+                                      <p:cBhvr>
+                                        <p:cTn id="7" dur="500"/>
+                                        <p:tgtEl>
+                                          <p:spTgt spid="3">
+                                            <p:txEl>
+                                              <p:pRg st="0" end="0"/>
+                                            </p:txEl>
+                                          </p:spTgt>
+                                        </p:tgtEl>
+                                      </p:cBhvr>
+                                    </p:animEffect>
+                                  </p:childTnLst>
+                                </p:cTn>
+                              </p:par>
+                            </p:childTnLst>
+                          </p:cTn>
+                        </p:par>
+                      </p:childTnLst>
+                    </p:cTn>
+                  </p:par>
+                  <p:par>
+                    <p:cTn id="8" fill="hold">
+                      <p:stCondLst>
+                        <p:cond delay="indefinite"/>
+                      </p:stCondLst>
+                      <p:childTnLst>
+                        <p:par>
+                          <p:cTn id="9" fill="hold">
+                            <p:stCondLst>
+                              <p:cond delay="0"/>
+                            </p:stCondLst>
+                            <p:childTnLst>
+                              <p:par>
+                                <p:cTn id="10" presetID="9" presetClass="entr" presetSubtype="0" fill="hold" grpId="0" nodeType="clickEffect">
+                                  <p:stCondLst>
+                                    <p:cond delay="0"/>
+                                  </p:stCondLst>
+                                  <p:childTnLst>
+                                    <p:set>
+                                      <p:cBhvr>
+                                        <p:cTn id="11" dur="1" fill="hold">
+                                          <p:stCondLst>
+                                            <p:cond delay="0"/>
+                                          </p:stCondLst>
+                                        </p:cTn>
+                                        <p:tgtEl>
+                                          <p:spTgt spid="3">
+                                            <p:txEl>
+                                              <p:pRg st="1" end="1"/>
+                                            </p:txEl>
+                                          </p:spTgt>
+                                        </p:tgtEl>
+                                        <p:attrNameLst>
+                                          <p:attrName>style.visibility</p:attrName>
+                                        </p:attrNameLst>
+                                      </p:cBhvr>
+                                      <p:to>
+                                        <p:strVal val="visible"/>
+                                      </p:to>
+                                    </p:set>
+                                    <p:animEffect transition="in" filter="dissolve">
+                                      <p:cBhvr>
+                                        <p:cTn id="12" dur="500"/>
+                                        <p:tgtEl>
+                                          <p:spTgt spid="3">
+                                            <p:txEl>
+                                              <p:pRg st="1" end="1"/>
+                                            </p:txEl>
+                                          </p:spTgt>
+                                        </p:tgtEl>
+                                      </p:cBhvr>
+                                    </p:animEffect>
+                                  </p:childTnLst>
+                                </p:cTn>
+                              </p:par>
+                            </p:childTnLst>
+                          </p:cTn>
+                        </p:par>
+                      </p:childTnLst>
+                    </p:cTn>
+                  </p:par>
+                  <p:par>
+                    <p:cTn id="13" fill="hold">
+                      <p:stCondLst>
+                        <p:cond delay="indefinite"/>
+                      </p:stCondLst>
+                      <p:childTnLst>
+                        <p:par>
+                          <p:cTn id="14" fill="hold">
+                            <p:stCondLst>
+                              <p:cond delay="0"/>
+                            </p:stCondLst>
+                            <p:childTnLst>
+                              <p:par>
+                                <p:cTn id="15" presetID="9" presetClass="entr" presetSubtype="0" fill="hold" grpId="0" nodeType="clickEffect">
+                                  <p:stCondLst>
+                                    <p:cond delay="0"/>
+                                  </p:stCondLst>
+                                  <p:childTnLst>
+                                    <p:set>
+                                      <p:cBhvr>
+                                        <p:cTn id="16" dur="1" fill="hold">
+                                          <p:stCondLst>
+                                            <p:cond delay="0"/>
+                                          </p:stCondLst>
+                                        </p:cTn>
+                                        <p:tgtEl>
+                                          <p:spTgt spid="3">
+                                            <p:txEl>
+                                              <p:pRg st="2" end="2"/>
+                                            </p:txEl>
+                                          </p:spTgt>
+                                        </p:tgtEl>
+                                        <p:attrNameLst>
+                                          <p:attrName>style.visibility</p:attrName>
+                                        </p:attrNameLst>
+                                      </p:cBhvr>
+                                      <p:to>
+                                        <p:strVal val="visible"/>
+                                      </p:to>
+                                    </p:set>
+                                    <p:animEffect transition="in" filter="dissolve">
+                                      <p:cBhvr>
+                                        <p:cTn id="17" dur="500"/>
+                                        <p:tgtEl>
+                                          <p:spTgt spid="3">
+                                            <p:txEl>
+                                              <p:pRg st="2" end="2"/>
+                                            </p:txEl>
+                                          </p:spTgt>
+                                        </p:tgtEl>
+                                      </p:cBhvr>
+                                    </p:animEffect>
+                                  </p:childTnLst>
+                                </p:cTn>
+                              </p:par>
+                            </p:childTnLst>
+                          </p:cTn>
+                        </p:par>
+                      </p:childTnLst>
+                    </p:cTn>
+                  </p:par>
+                  <p:par>
+                    <p:cTn id="18" fill="hold">
+                      <p:stCondLst>
+                        <p:cond delay="indefinite"/>
+                      </p:stCondLst>
+                      <p:childTnLst>
+                        <p:par>
+                          <p:cTn id="19" fill="hold">
+                            <p:stCondLst>
+                              <p:cond delay="0"/>
+                            </p:stCondLst>
+                            <p:childTnLst>
+                              <p:par>
+                                <p:cTn id="20" presetID="9" presetClass="entr" presetSubtype="0" fill="hold" grpId="0" nodeType="clickEffect">
+                                  <p:stCondLst>
+                                    <p:cond delay="0"/>
+                                  </p:stCondLst>
+                                  <p:childTnLst>
+                                    <p:set>
+                                      <p:cBhvr>
+                                        <p:cTn id="21" dur="1" fill="hold">
+                                          <p:stCondLst>
+                                            <p:cond delay="0"/>
+                                          </p:stCondLst>
+                                        </p:cTn>
+                                        <p:tgtEl>
+                                          <p:spTgt spid="3">
+                                            <p:txEl>
+                                              <p:pRg st="3" end="3"/>
+                                            </p:txEl>
+                                          </p:spTgt>
+                                        </p:tgtEl>
+                                        <p:attrNameLst>
+                                          <p:attrName>style.visibility</p:attrName>
+                                        </p:attrNameLst>
+                                      </p:cBhvr>
+                                      <p:to>
+                                        <p:strVal val="visible"/>
+                                      </p:to>
+                                    </p:set>
+                                    <p:animEffect transition="in" filter="dissolve">
+                                      <p:cBhvr>
+                                        <p:cTn id="22" dur="500"/>
+                                        <p:tgtEl>
+                                          <p:spTgt spid="3">
+                                            <p:txEl>
+                                              <p:pRg st="3" end="3"/>
+                                            </p:txEl>
+                                          </p:spTgt>
+                                        </p:tgtEl>
+                                      </p:cBhvr>
+                                    </p:animEffect>
+                                  </p:childTnLst>
+                                </p:cTn>
+                              </p:par>
+                            </p:childTnLst>
+                          </p:cTn>
+                        </p:par>
+                      </p:childTnLst>
+                    </p:cTn>
+                  </p:par>
+                </p:childTnLst>
+              </p:cTn>
+              <p:prevCondLst>
+                <p:cond evt="onPrev" delay="0">
+                  <p:tgtEl>
+                    <p:sldTgt/>
+                  </p:tgtEl>
+                </p:cond>
+              </p:prevCondLst>
+              <p:nextCondLst>
+                <p:cond evt="onNext" delay="0">
+                  <p:tgtEl>
+                    <p:sldTgt/>
+                  </p:tgtEl>
+                </p:cond>
+              </p:nextCondLst>
+            </p:seq>
+          </p:childTnLst>
+        </p:cTn>
+      </p:par>
+    </p:tnLst>
+    <p:bldLst>
+      <p:bldP spid="3" grpId="0" uiExpand="1" build="p"/>
+    </p:bldLst>
+  </p:timing>
+</p:sld>
 </file>
 
 <file path=ppt/theme/theme1.xml><?xml version="1.0" encoding="utf-8"?>

</xml_diff>